<commit_message>
Update Session 15 - ALM in Power BI with Deployment Pipelines.pptx
</commit_message>
<xml_diff>
--- a/Session 15 - ALM in Power BI with Deployment Pipelines.pptx
+++ b/Session 15 - ALM in Power BI with Deployment Pipelines.pptx
@@ -500,7 +500,7 @@
           <a:p>
             <a:fld id="{DCE60099-03E7-4FA1-8A7F-E6E6CFB0F855}" type="datetime8">
               <a:rPr lang="en-US" smtClean="0"/>
-              <a:t>10/28/2021 1:03 PM</a:t>
+              <a:t>10/28/2021 1:17 PM</a:t>
             </a:fld>
             <a:endParaRPr lang="en-US"/>
           </a:p>
@@ -1818,7 +1818,7 @@
                 <a:tabLst/>
                 <a:defRPr/>
               </a:pPr>
-              <a:t>10/28/2021 1:03 PM</a:t>
+              <a:t>10/28/2021 1:17 PM</a:t>
             </a:fld>
             <a:endParaRPr kumimoji="0" lang="en-US" sz="1200" b="0" i="0" u="none" strike="noStrike" kern="1200" cap="none" spc="0" normalizeH="0" baseline="0" noProof="0" dirty="0">
               <a:ln>
@@ -2154,7 +2154,7 @@
                 <a:tabLst/>
                 <a:defRPr/>
               </a:pPr>
-              <a:t>10/28/2021 1:03 PM</a:t>
+              <a:t>10/28/2021 1:17 PM</a:t>
             </a:fld>
             <a:endParaRPr kumimoji="0" lang="en-US" sz="1200" b="0" i="0" u="none" strike="noStrike" kern="1200" cap="none" spc="0" normalizeH="0" baseline="0" noProof="0" dirty="0">
               <a:ln>
@@ -2490,7 +2490,7 @@
                 <a:tabLst/>
                 <a:defRPr/>
               </a:pPr>
-              <a:t>10/28/2021 1:03 PM</a:t>
+              <a:t>10/28/2021 1:17 PM</a:t>
             </a:fld>
             <a:endParaRPr kumimoji="0" lang="en-US" sz="1200" b="0" i="0" u="none" strike="noStrike" kern="1200" cap="none" spc="0" normalizeH="0" baseline="0" noProof="0" dirty="0">
               <a:ln>
@@ -2830,7 +2830,7 @@
                 <a:tabLst/>
                 <a:defRPr/>
               </a:pPr>
-              <a:t>10/28/2021 1:03 PM</a:t>
+              <a:t>10/28/2021 1:17 PM</a:t>
             </a:fld>
             <a:endParaRPr kumimoji="0" lang="en-US" sz="1200" b="0" i="0" u="none" strike="noStrike" kern="1200" cap="none" spc="0" normalizeH="0" baseline="0" noProof="0" dirty="0">
               <a:ln>
@@ -6851,7 +6851,7 @@
           <a:graphicData uri="http://schemas.openxmlformats.org/presentationml/2006/ole">
             <mc:AlternateContent xmlns:mc="http://schemas.openxmlformats.org/markup-compatibility/2006">
               <mc:Choice xmlns:v="urn:schemas-microsoft-com:vml" Requires="v">
-                <p:oleObj spid="_x0000_s5126" name="Bitmap Image" r:id="rId3" imgW="14615280" imgH="6789600" progId="Paint.Picture">
+                <p:oleObj spid="_x0000_s5127" name="Bitmap Image" r:id="rId3" imgW="14615280" imgH="6789600" progId="Paint.Picture">
                   <p:embed/>
                 </p:oleObj>
               </mc:Choice>
@@ -16228,7 +16228,7 @@
           <a:graphicData uri="http://schemas.openxmlformats.org/presentationml/2006/ole">
             <mc:AlternateContent xmlns:mc="http://schemas.openxmlformats.org/markup-compatibility/2006">
               <mc:Choice xmlns:v="urn:schemas-microsoft-com:vml" Requires="v">
-                <p:oleObj spid="_x0000_s1091" name="Bitmap Image" r:id="rId4" imgW="380880" imgH="343080" progId="Paint.Picture">
+                <p:oleObj spid="_x0000_s1096" name="Bitmap Image" r:id="rId4" imgW="380880" imgH="343080" progId="Paint.Picture">
                   <p:embed/>
                 </p:oleObj>
               </mc:Choice>
@@ -16291,7 +16291,7 @@
           <a:graphicData uri="http://schemas.openxmlformats.org/presentationml/2006/ole">
             <mc:AlternateContent xmlns:mc="http://schemas.openxmlformats.org/markup-compatibility/2006">
               <mc:Choice xmlns:v="urn:schemas-microsoft-com:vml" Requires="v">
-                <p:oleObj spid="_x0000_s1092" name="Bitmap Image" r:id="rId6" imgW="373320" imgH="365760" progId="Paint.Picture">
+                <p:oleObj spid="_x0000_s1097" name="Bitmap Image" r:id="rId6" imgW="373320" imgH="365760" progId="Paint.Picture">
                   <p:embed/>
                 </p:oleObj>
               </mc:Choice>
@@ -16354,7 +16354,7 @@
           <a:graphicData uri="http://schemas.openxmlformats.org/presentationml/2006/ole">
             <mc:AlternateContent xmlns:mc="http://schemas.openxmlformats.org/markup-compatibility/2006">
               <mc:Choice xmlns:v="urn:schemas-microsoft-com:vml" Requires="v">
-                <p:oleObj spid="_x0000_s1093" name="Bitmap Image" r:id="rId8" imgW="358200" imgH="350640" progId="Paint.Picture">
+                <p:oleObj spid="_x0000_s1098" name="Bitmap Image" r:id="rId8" imgW="358200" imgH="350640" progId="Paint.Picture">
                   <p:embed/>
                 </p:oleObj>
               </mc:Choice>
@@ -16417,7 +16417,7 @@
           <a:graphicData uri="http://schemas.openxmlformats.org/presentationml/2006/ole">
             <mc:AlternateContent xmlns:mc="http://schemas.openxmlformats.org/markup-compatibility/2006">
               <mc:Choice xmlns:v="urn:schemas-microsoft-com:vml" Requires="v">
-                <p:oleObj spid="_x0000_s1094" name="Bitmap Image" r:id="rId10" imgW="358200" imgH="350640" progId="Paint.Picture">
+                <p:oleObj spid="_x0000_s1099" name="Bitmap Image" r:id="rId10" imgW="358200" imgH="350640" progId="Paint.Picture">
                   <p:embed/>
                 </p:oleObj>
               </mc:Choice>
@@ -16480,7 +16480,7 @@
           <a:graphicData uri="http://schemas.openxmlformats.org/presentationml/2006/ole">
             <mc:AlternateContent xmlns:mc="http://schemas.openxmlformats.org/markup-compatibility/2006">
               <mc:Choice xmlns:v="urn:schemas-microsoft-com:vml" Requires="v">
-                <p:oleObj spid="_x0000_s1095" name="Bitmap Image" r:id="rId12" imgW="358200" imgH="350640" progId="Paint.Picture">
+                <p:oleObj spid="_x0000_s1100" name="Bitmap Image" r:id="rId12" imgW="358200" imgH="350640" progId="Paint.Picture">
                   <p:embed/>
                 </p:oleObj>
               </mc:Choice>
@@ -22155,10 +22155,10 @@
       </p:sp>
       <p:pic>
         <p:nvPicPr>
-          <p:cNvPr id="5" name="Picture 4">
+          <p:cNvPr id="3" name="Picture 2">
             <a:extLst>
               <a:ext uri="{FF2B5EF4-FFF2-40B4-BE49-F238E27FC236}">
-                <a16:creationId xmlns:a16="http://schemas.microsoft.com/office/drawing/2014/main" id="{204574D1-A809-4DC0-8BD3-43A96C2D98CC}"/>
+                <a16:creationId xmlns:a16="http://schemas.microsoft.com/office/drawing/2014/main" id="{CAE07442-418B-437F-BAD9-9C82824FBBFD}"/>
               </a:ext>
             </a:extLst>
           </p:cNvPr>
@@ -22175,8 +22175,8 @@
         </p:blipFill>
         <p:spPr>
           <a:xfrm>
-            <a:off x="856035" y="1906591"/>
-            <a:ext cx="9430628" cy="4826754"/>
+            <a:off x="902823" y="1796896"/>
+            <a:ext cx="9193677" cy="5083329"/>
           </a:xfrm>
           <a:prstGeom prst="rect">
             <a:avLst/>
@@ -23468,7 +23468,7 @@
           <a:graphicData uri="http://schemas.openxmlformats.org/presentationml/2006/ole">
             <mc:AlternateContent xmlns:mc="http://schemas.openxmlformats.org/markup-compatibility/2006">
               <mc:Choice xmlns:v="urn:schemas-microsoft-com:vml" Requires="v">
-                <p:oleObj spid="_x0000_s6150" name="Bitmap Image" r:id="rId4" imgW="4526280" imgH="3863520" progId="Paint.Picture">
+                <p:oleObj spid="_x0000_s6151" name="Bitmap Image" r:id="rId4" imgW="4526280" imgH="3863520" progId="Paint.Picture">
                   <p:embed/>
                 </p:oleObj>
               </mc:Choice>
@@ -39054,21 +39054,12 @@
 </file>
 
 <file path=customXml/item1.xml><?xml version="1.0" encoding="utf-8"?>
-<?mso-contentType ?>
-<FormTemplates xmlns="http://schemas.microsoft.com/sharepoint/v3/contenttype/forms">
-  <Display>DocumentLibraryForm</Display>
-  <Edit>DocumentLibraryForm</Edit>
-  <New>DocumentLibraryForm</New>
-</FormTemplates>
-</file>
-
-<file path=customXml/item2.xml><?xml version="1.0" encoding="utf-8"?>
 <p:properties xmlns:p="http://schemas.microsoft.com/office/2006/metadata/properties" xmlns:xsi="http://www.w3.org/2001/XMLSchema-instance" xmlns:pc="http://schemas.microsoft.com/office/infopath/2007/PartnerControls">
   <documentManagement/>
 </p:properties>
 </file>
 
-<file path=customXml/item3.xml><?xml version="1.0" encoding="utf-8"?>
+<file path=customXml/item2.xml><?xml version="1.0" encoding="utf-8"?>
 <ct:contentTypeSchema xmlns:ct="http://schemas.microsoft.com/office/2006/metadata/contentType" xmlns:ma="http://schemas.microsoft.com/office/2006/metadata/properties/metaAttributes" ct:_="" ma:_="" ma:contentTypeName="Document" ma:contentTypeID="0x0101000937CBA2829AB54C847AA138BDB6DD62" ma:contentTypeVersion="6" ma:contentTypeDescription="Create a new document." ma:contentTypeScope="" ma:versionID="0f7e39fa3406a6f330081ac46f53a9d2">
   <xsd:schema xmlns:xsd="http://www.w3.org/2001/XMLSchema" xmlns:xs="http://www.w3.org/2001/XMLSchema" xmlns:p="http://schemas.microsoft.com/office/2006/metadata/properties" xmlns:ns2="ef38329b-e139-4eb4-9d7a-1b84c79a6610" targetNamespace="http://schemas.microsoft.com/office/2006/metadata/properties" ma:root="true" ma:fieldsID="c5e10262f8d934c139771ac03f38712c" ns2:_="">
     <xsd:import namespace="ef38329b-e139-4eb4-9d7a-1b84c79a6610"/>
@@ -39220,15 +39211,16 @@
 </ct:contentTypeSchema>
 </file>
 
-<file path=customXml/itemProps1.xml><?xml version="1.0" encoding="utf-8"?>
-<ds:datastoreItem xmlns:ds="http://schemas.openxmlformats.org/officeDocument/2006/customXml" ds:itemID="{758FDAC0-319D-4A54-8D8E-1D42CB1F8004}">
-  <ds:schemaRefs>
-    <ds:schemaRef ds:uri="http://schemas.microsoft.com/sharepoint/v3/contenttype/forms"/>
-  </ds:schemaRefs>
-</ds:datastoreItem>
+<file path=customXml/item3.xml><?xml version="1.0" encoding="utf-8"?>
+<?mso-contentType ?>
+<FormTemplates xmlns="http://schemas.microsoft.com/sharepoint/v3/contenttype/forms">
+  <Display>DocumentLibraryForm</Display>
+  <Edit>DocumentLibraryForm</Edit>
+  <New>DocumentLibraryForm</New>
+</FormTemplates>
 </file>
 
-<file path=customXml/itemProps2.xml><?xml version="1.0" encoding="utf-8"?>
+<file path=customXml/itemProps1.xml><?xml version="1.0" encoding="utf-8"?>
 <ds:datastoreItem xmlns:ds="http://schemas.openxmlformats.org/officeDocument/2006/customXml" ds:itemID="{F990F116-B58F-4255-B05B-DA3808E0E5C6}">
   <ds:schemaRefs>
     <ds:schemaRef ds:uri="http://schemas.openxmlformats.org/package/2006/metadata/core-properties"/>
@@ -39244,7 +39236,7 @@
 </ds:datastoreItem>
 </file>
 
-<file path=customXml/itemProps3.xml><?xml version="1.0" encoding="utf-8"?>
+<file path=customXml/itemProps2.xml><?xml version="1.0" encoding="utf-8"?>
 <ds:datastoreItem xmlns:ds="http://schemas.openxmlformats.org/officeDocument/2006/customXml" ds:itemID="{A4052A8C-2220-4E4B-95E2-C05C9863F10E}">
   <ds:schemaRefs>
     <ds:schemaRef ds:uri="ef38329b-e139-4eb4-9d7a-1b84c79a6610"/>
@@ -39262,6 +39254,14 @@
 </ds:datastoreItem>
 </file>
 
+<file path=customXml/itemProps3.xml><?xml version="1.0" encoding="utf-8"?>
+<ds:datastoreItem xmlns:ds="http://schemas.openxmlformats.org/officeDocument/2006/customXml" ds:itemID="{758FDAC0-319D-4A54-8D8E-1D42CB1F8004}">
+  <ds:schemaRefs>
+    <ds:schemaRef ds:uri="http://schemas.microsoft.com/sharepoint/v3/contenttype/forms"/>
+  </ds:schemaRefs>
+</ds:datastoreItem>
+</file>
+
 <file path=docMetadata/LabelInfo.xml><?xml version="1.0" encoding="utf-8"?>
 <clbl:labelList xmlns:clbl="http://schemas.microsoft.com/office/2020/mipLabelMetadata">
   <clbl:label id="{074e257c-5848-4582-9a6f-34a182080e71}" enabled="1" method="Privileged" siteId="{72f988bf-86f1-41af-91ab-2d7cd011db47}" removed="0"/>

</xml_diff>